<commit_message>
update changes for DumbMonkeyScreen
</commit_message>
<xml_diff>
--- a/artifacts/XNA Programming on Windows Phone 7.pptx
+++ b/artifacts/XNA Programming on Windows Phone 7.pptx
@@ -5,10 +5,10 @@
     <p:sldMasterId id="2147483661" r:id="rId1"/>
   </p:sldMasterIdLst>
   <p:notesMasterIdLst>
-    <p:notesMasterId r:id="rId10"/>
+    <p:notesMasterId r:id="rId11"/>
   </p:notesMasterIdLst>
   <p:handoutMasterIdLst>
-    <p:handoutMasterId r:id="rId11"/>
+    <p:handoutMasterId r:id="rId12"/>
   </p:handoutMasterIdLst>
   <p:sldIdLst>
     <p:sldId id="256" r:id="rId2"/>
@@ -16,9 +16,10 @@
     <p:sldId id="259" r:id="rId4"/>
     <p:sldId id="260" r:id="rId5"/>
     <p:sldId id="261" r:id="rId6"/>
-    <p:sldId id="262" r:id="rId7"/>
-    <p:sldId id="263" r:id="rId8"/>
-    <p:sldId id="264" r:id="rId9"/>
+    <p:sldId id="265" r:id="rId7"/>
+    <p:sldId id="262" r:id="rId8"/>
+    <p:sldId id="263" r:id="rId9"/>
+    <p:sldId id="264" r:id="rId10"/>
   </p:sldIdLst>
   <p:sldSz cx="9144000" cy="6858000" type="screen4x3"/>
   <p:notesSz cx="6997700" cy="9283700"/>
@@ -5455,7 +5456,11 @@
           <a:p>
             <a:r>
               <a:rPr lang="en-US" dirty="0" smtClean="0"/>
-              <a:t>Demonstrate Building an App</a:t>
+              <a:t>Using </a:t>
+            </a:r>
+            <a:r>
+              <a:rPr lang="en-US" dirty="0" err="1" smtClean="0"/>
+              <a:t>XnaMobileUnit</a:t>
             </a:r>
             <a:endParaRPr lang="en-US" dirty="0"/>
           </a:p>
@@ -5481,14 +5486,18 @@
           <a:p>
             <a:r>
               <a:rPr lang="en-US" dirty="0" smtClean="0"/>
-              <a:t>Walk through building an app.</a:t>
+              <a:t>Demo with </a:t>
+            </a:r>
+            <a:r>
+              <a:rPr lang="en-US" dirty="0" err="1" smtClean="0"/>
+              <a:t>CazualGames</a:t>
             </a:r>
             <a:endParaRPr lang="en-US" dirty="0"/>
           </a:p>
           <a:p>
             <a:r>
               <a:rPr lang="en-US" dirty="0" smtClean="0"/>
-              <a:t>Explain the anatomy of an app</a:t>
+              <a:t>Features</a:t>
             </a:r>
             <a:endParaRPr lang="en-US" dirty="0"/>
           </a:p>
@@ -5531,7 +5540,7 @@
       </p:grpSpPr>
       <p:sp>
         <p:nvSpPr>
-          <p:cNvPr id="11266" name="Rectangle 2"/>
+          <p:cNvPr id="10242" name="Rectangle 2"/>
           <p:cNvSpPr>
             <a:spLocks noGrp="1" noChangeArrowheads="1"/>
           </p:cNvSpPr>
@@ -5548,15 +5557,16 @@
           <a:lstStyle/>
           <a:p>
             <a:r>
-              <a:rPr lang="en-US"/>
-              <a:t>Summary</a:t>
-            </a:r>
-          </a:p>
-        </p:txBody>
-      </p:sp>
-      <p:sp>
-        <p:nvSpPr>
-          <p:cNvPr id="11267" name="Rectangle 3"/>
+              <a:rPr lang="en-US" dirty="0" smtClean="0"/>
+              <a:t>Demonstrate Building an App</a:t>
+            </a:r>
+            <a:endParaRPr lang="en-US" dirty="0"/>
+          </a:p>
+        </p:txBody>
+      </p:sp>
+      <p:sp>
+        <p:nvSpPr>
+          <p:cNvPr id="10243" name="Rectangle 3"/>
           <p:cNvSpPr>
             <a:spLocks noGrp="1" noChangeArrowheads="1"/>
           </p:cNvSpPr>
@@ -5574,21 +5584,18 @@
           <a:p>
             <a:r>
               <a:rPr lang="en-US" dirty="0" smtClean="0"/>
-              <a:t>Tools</a:t>
+              <a:t>Walk through </a:t>
+            </a:r>
+            <a:r>
+              <a:rPr lang="en-US" dirty="0" smtClean="0"/>
+              <a:t>demo app</a:t>
             </a:r>
             <a:endParaRPr lang="en-US" dirty="0"/>
           </a:p>
           <a:p>
             <a:r>
               <a:rPr lang="en-US" dirty="0" smtClean="0"/>
-              <a:t>Resources</a:t>
-            </a:r>
-            <a:endParaRPr lang="en-US" dirty="0"/>
-          </a:p>
-          <a:p>
-            <a:r>
-              <a:rPr lang="en-US" dirty="0" smtClean="0"/>
-              <a:t>Anatomy of an XNA Mobile App</a:t>
+              <a:t>Screen Navigation</a:t>
             </a:r>
             <a:endParaRPr lang="en-US" dirty="0"/>
           </a:p>
@@ -5613,6 +5620,106 @@
 </file>
 
 <file path=ppt/slides/slide8.xml><?xml version="1.0" encoding="utf-8"?>
+<p:sld xmlns:a="http://schemas.openxmlformats.org/drawingml/2006/main" xmlns:r="http://schemas.openxmlformats.org/officeDocument/2006/relationships" xmlns:p="http://schemas.openxmlformats.org/presentationml/2006/main">
+  <p:cSld>
+    <p:spTree>
+      <p:nvGrpSpPr>
+        <p:cNvPr id="1" name=""/>
+        <p:cNvGrpSpPr/>
+        <p:nvPr/>
+      </p:nvGrpSpPr>
+      <p:grpSpPr>
+        <a:xfrm>
+          <a:off x="0" y="0"/>
+          <a:ext cx="0" cy="0"/>
+          <a:chOff x="0" y="0"/>
+          <a:chExt cx="0" cy="0"/>
+        </a:xfrm>
+      </p:grpSpPr>
+      <p:sp>
+        <p:nvSpPr>
+          <p:cNvPr id="11266" name="Rectangle 2"/>
+          <p:cNvSpPr>
+            <a:spLocks noGrp="1" noChangeArrowheads="1"/>
+          </p:cNvSpPr>
+          <p:nvPr>
+            <p:ph type="title"/>
+          </p:nvPr>
+        </p:nvSpPr>
+        <p:spPr>
+          <a:noFill/>
+          <a:ln/>
+        </p:spPr>
+        <p:txBody>
+          <a:bodyPr lIns="92075" tIns="46038" rIns="92075" bIns="46038" anchor="ctr"/>
+          <a:lstStyle/>
+          <a:p>
+            <a:r>
+              <a:rPr lang="en-US"/>
+              <a:t>Summary</a:t>
+            </a:r>
+          </a:p>
+        </p:txBody>
+      </p:sp>
+      <p:sp>
+        <p:nvSpPr>
+          <p:cNvPr id="11267" name="Rectangle 3"/>
+          <p:cNvSpPr>
+            <a:spLocks noGrp="1" noChangeArrowheads="1"/>
+          </p:cNvSpPr>
+          <p:nvPr>
+            <p:ph type="body" idx="1"/>
+          </p:nvPr>
+        </p:nvSpPr>
+        <p:spPr>
+          <a:noFill/>
+          <a:ln/>
+        </p:spPr>
+        <p:txBody>
+          <a:bodyPr lIns="182562" tIns="46038" rIns="182562" bIns="46038"/>
+          <a:lstStyle/>
+          <a:p>
+            <a:r>
+              <a:rPr lang="en-US" dirty="0" smtClean="0"/>
+              <a:t>Tools</a:t>
+            </a:r>
+            <a:endParaRPr lang="en-US" dirty="0"/>
+          </a:p>
+          <a:p>
+            <a:r>
+              <a:rPr lang="en-US" dirty="0" smtClean="0"/>
+              <a:t>Resources</a:t>
+            </a:r>
+            <a:endParaRPr lang="en-US" dirty="0"/>
+          </a:p>
+          <a:p>
+            <a:r>
+              <a:rPr lang="en-US" dirty="0" smtClean="0"/>
+              <a:t>Anatomy of an XNA Mobile App</a:t>
+            </a:r>
+            <a:endParaRPr lang="en-US" dirty="0"/>
+          </a:p>
+        </p:txBody>
+      </p:sp>
+    </p:spTree>
+  </p:cSld>
+  <p:clrMapOvr>
+    <a:masterClrMapping/>
+  </p:clrMapOvr>
+  <p:transition spd="med">
+    <p:fade/>
+  </p:transition>
+  <p:timing>
+    <p:tnLst>
+      <p:par>
+        <p:cTn id="1" dur="indefinite" restart="never" nodeType="tmRoot"/>
+      </p:par>
+    </p:tnLst>
+  </p:timing>
+</p:sld>
+</file>
+
+<file path=ppt/slides/slide9.xml><?xml version="1.0" encoding="utf-8"?>
 <p:sld xmlns:a="http://schemas.openxmlformats.org/drawingml/2006/main" xmlns:r="http://schemas.openxmlformats.org/officeDocument/2006/relationships" xmlns:p="http://schemas.openxmlformats.org/presentationml/2006/main">
   <p:cSld>
     <p:spTree>

</xml_diff>